<commit_message>
First changes to update Adoption stuff for Kate
</commit_message>
<xml_diff>
--- a/WorkplaceAnalytics/MyAnalytics/Use/MyA-Adoption/Habit-playbook-template.pptx
+++ b/WorkplaceAnalytics/MyAnalytics/Use/MyA-Adoption/Habit-playbook-template.pptx
@@ -115,6 +115,186 @@
 </p:presentation>
 </file>
 
+<file path=ppt/revisionInfo.xml><?xml version="1.0" encoding="utf-8"?>
+<p1510:revInfo xmlns:a="http://schemas.openxmlformats.org/drawingml/2006/main" xmlns:r="http://schemas.openxmlformats.org/officeDocument/2006/relationships" xmlns:p1510="http://schemas.microsoft.com/office/powerpoint/2015/10/main">
+  <p1510:revLst>
+    <p1510:client id="{A787B3C4-F839-4E79-8FAD-D223E4544A0E}" v="2" dt="2018-09-14T21:38:16.001"/>
+  </p1510:revLst>
+</p1510:revInfo>
+</file>
+
+<file path=ppt/changesInfos/changesInfo1.xml><?xml version="1.0" encoding="utf-8"?>
+<pc:chgInfo xmlns:a="http://schemas.openxmlformats.org/drawingml/2006/main" xmlns:r="http://schemas.openxmlformats.org/officeDocument/2006/relationships" xmlns:ac="http://schemas.microsoft.com/office/drawing/2013/main/command" xmlns:pc="http://schemas.microsoft.com/office/powerpoint/2013/main/command">
+  <pc:docChgLst>
+    <pc:chgData name="Kate Nowak" userId="474ed806-8d7d-491e-9e78-f957e200026e" providerId="ADAL" clId="{A787B3C4-F839-4E79-8FAD-D223E4544A0E}"/>
+    <pc:docChg chg="delSld modSld">
+      <pc:chgData name="Kate Nowak" userId="474ed806-8d7d-491e-9e78-f957e200026e" providerId="ADAL" clId="{A787B3C4-F839-4E79-8FAD-D223E4544A0E}" dt="2018-09-14T21:38:16.001" v="12"/>
+      <pc:docMkLst>
+        <pc:docMk/>
+      </pc:docMkLst>
+      <pc:sldChg chg="modSp">
+        <pc:chgData name="Kate Nowak" userId="474ed806-8d7d-491e-9e78-f957e200026e" providerId="ADAL" clId="{A787B3C4-F839-4E79-8FAD-D223E4544A0E}" dt="2018-09-14T21:37:06.117" v="11" actId="20577"/>
+        <pc:sldMkLst>
+          <pc:docMk/>
+          <pc:sldMk cId="2220658923" sldId="269"/>
+        </pc:sldMkLst>
+        <pc:spChg chg="mod">
+          <ac:chgData name="Kate Nowak" userId="474ed806-8d7d-491e-9e78-f957e200026e" providerId="ADAL" clId="{A787B3C4-F839-4E79-8FAD-D223E4544A0E}" dt="2018-09-14T21:37:06.117" v="11" actId="20577"/>
+          <ac:spMkLst>
+            <pc:docMk/>
+            <pc:sldMk cId="2220658923" sldId="269"/>
+            <ac:spMk id="5" creationId="{6AD3089D-B515-4EBB-A14A-81D5D8902F0C}"/>
+          </ac:spMkLst>
+        </pc:spChg>
+        <pc:spChg chg="mod">
+          <ac:chgData name="Kate Nowak" userId="474ed806-8d7d-491e-9e78-f957e200026e" providerId="ADAL" clId="{A787B3C4-F839-4E79-8FAD-D223E4544A0E}" dt="2018-09-14T21:36:45.619" v="0" actId="242"/>
+          <ac:spMkLst>
+            <pc:docMk/>
+            <pc:sldMk cId="2220658923" sldId="269"/>
+            <ac:spMk id="920" creationId="{2F7158F0-7A9A-472A-8BA8-BD3C111DD6F8}"/>
+          </ac:spMkLst>
+        </pc:spChg>
+      </pc:sldChg>
+      <pc:sldChg chg="del">
+        <pc:chgData name="Kate Nowak" userId="474ed806-8d7d-491e-9e78-f957e200026e" providerId="ADAL" clId="{A787B3C4-F839-4E79-8FAD-D223E4544A0E}" dt="2018-09-14T21:38:16.001" v="12"/>
+        <pc:sldMkLst>
+          <pc:docMk/>
+          <pc:sldMk cId="4098505362" sldId="270"/>
+        </pc:sldMkLst>
+      </pc:sldChg>
+    </pc:docChg>
+  </pc:docChgLst>
+  <pc:docChgLst>
+    <pc:chgData name="Kate Nowak" userId="474ed806-8d7d-491e-9e78-f957e200026e" providerId="ADAL" clId="{799D1646-E560-49D6-9BD6-0DC1733704E2}"/>
+    <pc:docChg chg="">
+      <pc:chgData name="Kate Nowak" userId="474ed806-8d7d-491e-9e78-f957e200026e" providerId="ADAL" clId="{799D1646-E560-49D6-9BD6-0DC1733704E2}" dt="2018-04-03T22:58:17.135" v="13" actId="2696"/>
+      <pc:docMkLst>
+        <pc:docMk/>
+      </pc:docMkLst>
+      <pc:sldMasterChg chg="delSldLayout">
+        <pc:chgData name="Kate Nowak" userId="474ed806-8d7d-491e-9e78-f957e200026e" providerId="ADAL" clId="{799D1646-E560-49D6-9BD6-0DC1733704E2}" dt="2018-04-03T22:58:17.135" v="13" actId="2696"/>
+        <pc:sldMasterMkLst>
+          <pc:docMk/>
+          <pc:sldMasterMk cId="3544210764" sldId="2147483660"/>
+        </pc:sldMasterMkLst>
+        <pc:sldLayoutChg chg="del">
+          <pc:chgData name="Kate Nowak" userId="474ed806-8d7d-491e-9e78-f957e200026e" providerId="ADAL" clId="{799D1646-E560-49D6-9BD6-0DC1733704E2}" dt="2018-04-03T22:58:04.341" v="0" actId="2696"/>
+          <pc:sldLayoutMkLst>
+            <pc:docMk/>
+            <pc:sldMasterMk cId="3544210764" sldId="2147483660"/>
+            <pc:sldLayoutMk cId="2517689572" sldId="2147483661"/>
+          </pc:sldLayoutMkLst>
+        </pc:sldLayoutChg>
+        <pc:sldLayoutChg chg="del">
+          <pc:chgData name="Kate Nowak" userId="474ed806-8d7d-491e-9e78-f957e200026e" providerId="ADAL" clId="{799D1646-E560-49D6-9BD6-0DC1733704E2}" dt="2018-04-03T22:58:05.075" v="1" actId="2696"/>
+          <pc:sldLayoutMkLst>
+            <pc:docMk/>
+            <pc:sldMasterMk cId="3544210764" sldId="2147483660"/>
+            <pc:sldLayoutMk cId="2243905854" sldId="2147483662"/>
+          </pc:sldLayoutMkLst>
+        </pc:sldLayoutChg>
+        <pc:sldLayoutChg chg="del">
+          <pc:chgData name="Kate Nowak" userId="474ed806-8d7d-491e-9e78-f957e200026e" providerId="ADAL" clId="{799D1646-E560-49D6-9BD6-0DC1733704E2}" dt="2018-04-03T22:58:05.776" v="2" actId="2696"/>
+          <pc:sldLayoutMkLst>
+            <pc:docMk/>
+            <pc:sldMasterMk cId="3544210764" sldId="2147483660"/>
+            <pc:sldLayoutMk cId="3231670978" sldId="2147483663"/>
+          </pc:sldLayoutMkLst>
+        </pc:sldLayoutChg>
+        <pc:sldLayoutChg chg="del">
+          <pc:chgData name="Kate Nowak" userId="474ed806-8d7d-491e-9e78-f957e200026e" providerId="ADAL" clId="{799D1646-E560-49D6-9BD6-0DC1733704E2}" dt="2018-04-03T22:58:07.363" v="3" actId="2696"/>
+          <pc:sldLayoutMkLst>
+            <pc:docMk/>
+            <pc:sldMasterMk cId="3544210764" sldId="2147483660"/>
+            <pc:sldLayoutMk cId="3509169666" sldId="2147483664"/>
+          </pc:sldLayoutMkLst>
+        </pc:sldLayoutChg>
+        <pc:sldLayoutChg chg="del">
+          <pc:chgData name="Kate Nowak" userId="474ed806-8d7d-491e-9e78-f957e200026e" providerId="ADAL" clId="{799D1646-E560-49D6-9BD6-0DC1733704E2}" dt="2018-04-03T22:58:13.818" v="4" actId="2696"/>
+          <pc:sldLayoutMkLst>
+            <pc:docMk/>
+            <pc:sldMasterMk cId="3544210764" sldId="2147483660"/>
+            <pc:sldLayoutMk cId="4123020833" sldId="2147483666"/>
+          </pc:sldLayoutMkLst>
+        </pc:sldLayoutChg>
+        <pc:sldLayoutChg chg="del">
+          <pc:chgData name="Kate Nowak" userId="474ed806-8d7d-491e-9e78-f957e200026e" providerId="ADAL" clId="{799D1646-E560-49D6-9BD6-0DC1733704E2}" dt="2018-04-03T22:58:13.854" v="5" actId="2696"/>
+          <pc:sldLayoutMkLst>
+            <pc:docMk/>
+            <pc:sldMasterMk cId="3544210764" sldId="2147483660"/>
+            <pc:sldLayoutMk cId="1728737993" sldId="2147483667"/>
+          </pc:sldLayoutMkLst>
+        </pc:sldLayoutChg>
+        <pc:sldLayoutChg chg="del">
+          <pc:chgData name="Kate Nowak" userId="474ed806-8d7d-491e-9e78-f957e200026e" providerId="ADAL" clId="{799D1646-E560-49D6-9BD6-0DC1733704E2}" dt="2018-04-03T22:58:13.885" v="6" actId="2696"/>
+          <pc:sldLayoutMkLst>
+            <pc:docMk/>
+            <pc:sldMasterMk cId="3544210764" sldId="2147483660"/>
+            <pc:sldLayoutMk cId="617959746" sldId="2147483668"/>
+          </pc:sldLayoutMkLst>
+        </pc:sldLayoutChg>
+        <pc:sldLayoutChg chg="del">
+          <pc:chgData name="Kate Nowak" userId="474ed806-8d7d-491e-9e78-f957e200026e" providerId="ADAL" clId="{799D1646-E560-49D6-9BD6-0DC1733704E2}" dt="2018-04-03T22:58:13.916" v="7" actId="2696"/>
+          <pc:sldLayoutMkLst>
+            <pc:docMk/>
+            <pc:sldMasterMk cId="3544210764" sldId="2147483660"/>
+            <pc:sldLayoutMk cId="1031963117" sldId="2147483669"/>
+          </pc:sldLayoutMkLst>
+        </pc:sldLayoutChg>
+        <pc:sldLayoutChg chg="del">
+          <pc:chgData name="Kate Nowak" userId="474ed806-8d7d-491e-9e78-f957e200026e" providerId="ADAL" clId="{799D1646-E560-49D6-9BD6-0DC1733704E2}" dt="2018-04-03T22:58:13.954" v="8" actId="2696"/>
+          <pc:sldLayoutMkLst>
+            <pc:docMk/>
+            <pc:sldMasterMk cId="3544210764" sldId="2147483660"/>
+            <pc:sldLayoutMk cId="1052342623" sldId="2147483670"/>
+          </pc:sldLayoutMkLst>
+        </pc:sldLayoutChg>
+        <pc:sldLayoutChg chg="del">
+          <pc:chgData name="Kate Nowak" userId="474ed806-8d7d-491e-9e78-f957e200026e" providerId="ADAL" clId="{799D1646-E560-49D6-9BD6-0DC1733704E2}" dt="2018-04-03T22:58:13.954" v="9" actId="2696"/>
+          <pc:sldLayoutMkLst>
+            <pc:docMk/>
+            <pc:sldMasterMk cId="3544210764" sldId="2147483660"/>
+            <pc:sldLayoutMk cId="2161497158" sldId="2147483671"/>
+          </pc:sldLayoutMkLst>
+        </pc:sldLayoutChg>
+        <pc:sldLayoutChg chg="del">
+          <pc:chgData name="Kate Nowak" userId="474ed806-8d7d-491e-9e78-f957e200026e" providerId="ADAL" clId="{799D1646-E560-49D6-9BD6-0DC1733704E2}" dt="2018-04-03T22:58:13.970" v="10" actId="2696"/>
+          <pc:sldLayoutMkLst>
+            <pc:docMk/>
+            <pc:sldMasterMk cId="3544210764" sldId="2147483660"/>
+            <pc:sldLayoutMk cId="55040117" sldId="2147483672"/>
+          </pc:sldLayoutMkLst>
+        </pc:sldLayoutChg>
+        <pc:sldLayoutChg chg="del">
+          <pc:chgData name="Kate Nowak" userId="474ed806-8d7d-491e-9e78-f957e200026e" providerId="ADAL" clId="{799D1646-E560-49D6-9BD6-0DC1733704E2}" dt="2018-04-03T22:58:13.985" v="11" actId="2696"/>
+          <pc:sldLayoutMkLst>
+            <pc:docMk/>
+            <pc:sldMasterMk cId="3544210764" sldId="2147483660"/>
+            <pc:sldLayoutMk cId="1648308354" sldId="2147483673"/>
+          </pc:sldLayoutMkLst>
+        </pc:sldLayoutChg>
+        <pc:sldLayoutChg chg="del">
+          <pc:chgData name="Kate Nowak" userId="474ed806-8d7d-491e-9e78-f957e200026e" providerId="ADAL" clId="{799D1646-E560-49D6-9BD6-0DC1733704E2}" dt="2018-04-03T22:58:17.119" v="12" actId="2696"/>
+          <pc:sldLayoutMkLst>
+            <pc:docMk/>
+            <pc:sldMasterMk cId="3544210764" sldId="2147483660"/>
+            <pc:sldLayoutMk cId="1948833718" sldId="2147483674"/>
+          </pc:sldLayoutMkLst>
+        </pc:sldLayoutChg>
+        <pc:sldLayoutChg chg="del">
+          <pc:chgData name="Kate Nowak" userId="474ed806-8d7d-491e-9e78-f957e200026e" providerId="ADAL" clId="{799D1646-E560-49D6-9BD6-0DC1733704E2}" dt="2018-04-03T22:58:17.135" v="13" actId="2696"/>
+          <pc:sldLayoutMkLst>
+            <pc:docMk/>
+            <pc:sldMasterMk cId="3544210764" sldId="2147483660"/>
+            <pc:sldLayoutMk cId="3711248014" sldId="2147483675"/>
+          </pc:sldLayoutMkLst>
+        </pc:sldLayoutChg>
+      </pc:sldMasterChg>
+    </pc:docChg>
+  </pc:docChgLst>
+</pc:chgInfo>
+</file>
+
 <file path=ppt/notesMasters/notesMaster1.xml><?xml version="1.0" encoding="utf-8"?>
 <p:notesMaster xmlns:a="http://schemas.openxmlformats.org/drawingml/2006/main" xmlns:r="http://schemas.openxmlformats.org/officeDocument/2006/relationships" xmlns:p="http://schemas.openxmlformats.org/presentationml/2006/main">
   <p:cSld>
@@ -197,7 +377,7 @@
           <a:p>
             <a:fld id="{BD2BD5D2-B93A-4C11-A5E4-C2D398072616}" type="datetimeFigureOut">
               <a:rPr lang="en-US" smtClean="0"/>
-              <a:t>4/3/2018</a:t>
+              <a:t>9/14/2018</a:t>
             </a:fld>
             <a:endParaRPr lang="en-US"/>
           </a:p>
@@ -2880,7 +3060,7 @@
             <a:pPr lvl="1"/>
             <a:r>
               <a:rPr lang="en-US" sz="1200" dirty="0"/>
-              <a:t>[INSERT WHY THIS HABIT IS IMPORTANT TO FORM]</a:t>
+              <a:t>[INSERT WHY THIS HABIT IS IMPORTANT TO DEVELOP]</a:t>
             </a:r>
           </a:p>
         </p:txBody>
@@ -3148,7 +3328,7 @@
         </p:nvSpPr>
         <p:spPr/>
         <p:txBody>
-          <a:bodyPr/>
+          <a:bodyPr anchor="ctr"/>
           <a:lstStyle/>
           <a:p>
             <a:pPr lvl="1"/>

</xml_diff>

<commit_message>
new pdf and pptx in Adoption docs
</commit_message>
<xml_diff>
--- a/WorkplaceAnalytics/MyAnalytics/Use/MyA-Adoption/Habit-playbook-template.pptx
+++ b/WorkplaceAnalytics/MyAnalytics/Use/MyA-Adoption/Habit-playbook-template.pptx
@@ -128,12 +128,12 @@
   <pc:docChgLst>
     <pc:chgData name="Kate Nowak" userId="474ed806-8d7d-491e-9e78-f957e200026e" providerId="ADAL" clId="{A787B3C4-F839-4E79-8FAD-D223E4544A0E}"/>
     <pc:docChg chg="delSld modSld">
-      <pc:chgData name="Kate Nowak" userId="474ed806-8d7d-491e-9e78-f957e200026e" providerId="ADAL" clId="{A787B3C4-F839-4E79-8FAD-D223E4544A0E}" dt="2018-09-14T21:38:16.001" v="12"/>
+      <pc:chgData name="Kate Nowak" userId="474ed806-8d7d-491e-9e78-f957e200026e" providerId="ADAL" clId="{A787B3C4-F839-4E79-8FAD-D223E4544A0E}" dt="2018-09-20T16:52:54.901" v="13" actId="20577"/>
       <pc:docMkLst>
         <pc:docMk/>
       </pc:docMkLst>
       <pc:sldChg chg="modSp">
-        <pc:chgData name="Kate Nowak" userId="474ed806-8d7d-491e-9e78-f957e200026e" providerId="ADAL" clId="{A787B3C4-F839-4E79-8FAD-D223E4544A0E}" dt="2018-09-14T21:37:06.117" v="11" actId="20577"/>
+        <pc:chgData name="Kate Nowak" userId="474ed806-8d7d-491e-9e78-f957e200026e" providerId="ADAL" clId="{A787B3C4-F839-4E79-8FAD-D223E4544A0E}" dt="2018-09-20T16:52:54.901" v="13" actId="20577"/>
         <pc:sldMkLst>
           <pc:docMk/>
           <pc:sldMk cId="2220658923" sldId="269"/>
@@ -152,6 +152,14 @@
             <pc:docMk/>
             <pc:sldMk cId="2220658923" sldId="269"/>
             <ac:spMk id="920" creationId="{2F7158F0-7A9A-472A-8BA8-BD3C111DD6F8}"/>
+          </ac:spMkLst>
+        </pc:spChg>
+        <pc:spChg chg="mod">
+          <ac:chgData name="Kate Nowak" userId="474ed806-8d7d-491e-9e78-f957e200026e" providerId="ADAL" clId="{A787B3C4-F839-4E79-8FAD-D223E4544A0E}" dt="2018-09-20T16:52:54.901" v="13" actId="20577"/>
+          <ac:spMkLst>
+            <pc:docMk/>
+            <pc:sldMk cId="2220658923" sldId="269"/>
+            <ac:spMk id="951" creationId="{F90B76D8-E2F5-4052-B20A-3341159EA7BF}"/>
           </ac:spMkLst>
         </pc:spChg>
       </pc:sldChg>
@@ -377,7 +385,7 @@
           <a:p>
             <a:fld id="{BD2BD5D2-B93A-4C11-A5E4-C2D398072616}" type="datetimeFigureOut">
               <a:rPr lang="en-US" smtClean="0"/>
-              <a:t>9/14/2018</a:t>
+              <a:t>9/20/2018</a:t>
             </a:fld>
             <a:endParaRPr lang="en-US"/>
           </a:p>
@@ -3404,8 +3412,8 @@
           <a:lstStyle/>
           <a:p>
             <a:r>
-              <a:rPr lang="en-US"/>
-              <a:t>Ideas</a:t>
+              <a:rPr lang="en-US" dirty="0"/>
+              <a:t>Idea</a:t>
             </a:r>
           </a:p>
         </p:txBody>

</xml_diff>